<commit_message>
Updated mb bg iso vs time and mlt plots
</commit_message>
<xml_diff>
--- a/sampexlib/Concept Summaries/MB-Iso_vs_BG-Iso.pptx
+++ b/sampexlib/Concept Summaries/MB-Iso_vs_BG-Iso.pptx
@@ -206,7 +206,7 @@
           <a:p>
             <a:fld id="{78EB3A88-4723-4221-9FD6-DC45C1FEF397}" type="datetimeFigureOut">
               <a:rPr lang="en-US" smtClean="0"/>
-              <a:t>5/14/2021</a:t>
+              <a:t>10/7/2021</a:t>
             </a:fld>
             <a:endParaRPr lang="en-US"/>
           </a:p>
@@ -1292,7 +1292,7 @@
           <a:p>
             <a:fld id="{E7773031-FEBD-457C-8C53-07D5C4D3FF8B}" type="datetimeFigureOut">
               <a:rPr lang="en-US" smtClean="0"/>
-              <a:t>5/14/2021</a:t>
+              <a:t>10/7/2021</a:t>
             </a:fld>
             <a:endParaRPr lang="en-US"/>
           </a:p>
@@ -1490,7 +1490,7 @@
           <a:p>
             <a:fld id="{E7773031-FEBD-457C-8C53-07D5C4D3FF8B}" type="datetimeFigureOut">
               <a:rPr lang="en-US" smtClean="0"/>
-              <a:t>5/14/2021</a:t>
+              <a:t>10/7/2021</a:t>
             </a:fld>
             <a:endParaRPr lang="en-US"/>
           </a:p>
@@ -1698,7 +1698,7 @@
           <a:p>
             <a:fld id="{E7773031-FEBD-457C-8C53-07D5C4D3FF8B}" type="datetimeFigureOut">
               <a:rPr lang="en-US" smtClean="0"/>
-              <a:t>5/14/2021</a:t>
+              <a:t>10/7/2021</a:t>
             </a:fld>
             <a:endParaRPr lang="en-US"/>
           </a:p>
@@ -1896,7 +1896,7 @@
           <a:p>
             <a:fld id="{E7773031-FEBD-457C-8C53-07D5C4D3FF8B}" type="datetimeFigureOut">
               <a:rPr lang="en-US" smtClean="0"/>
-              <a:t>5/14/2021</a:t>
+              <a:t>10/7/2021</a:t>
             </a:fld>
             <a:endParaRPr lang="en-US"/>
           </a:p>
@@ -2171,7 +2171,7 @@
           <a:p>
             <a:fld id="{E7773031-FEBD-457C-8C53-07D5C4D3FF8B}" type="datetimeFigureOut">
               <a:rPr lang="en-US" smtClean="0"/>
-              <a:t>5/14/2021</a:t>
+              <a:t>10/7/2021</a:t>
             </a:fld>
             <a:endParaRPr lang="en-US"/>
           </a:p>
@@ -2436,7 +2436,7 @@
           <a:p>
             <a:fld id="{E7773031-FEBD-457C-8C53-07D5C4D3FF8B}" type="datetimeFigureOut">
               <a:rPr lang="en-US" smtClean="0"/>
-              <a:t>5/14/2021</a:t>
+              <a:t>10/7/2021</a:t>
             </a:fld>
             <a:endParaRPr lang="en-US"/>
           </a:p>
@@ -2848,7 +2848,7 @@
           <a:p>
             <a:fld id="{E7773031-FEBD-457C-8C53-07D5C4D3FF8B}" type="datetimeFigureOut">
               <a:rPr lang="en-US" smtClean="0"/>
-              <a:t>5/14/2021</a:t>
+              <a:t>10/7/2021</a:t>
             </a:fld>
             <a:endParaRPr lang="en-US"/>
           </a:p>
@@ -2989,7 +2989,7 @@
           <a:p>
             <a:fld id="{E7773031-FEBD-457C-8C53-07D5C4D3FF8B}" type="datetimeFigureOut">
               <a:rPr lang="en-US" smtClean="0"/>
-              <a:t>5/14/2021</a:t>
+              <a:t>10/7/2021</a:t>
             </a:fld>
             <a:endParaRPr lang="en-US"/>
           </a:p>
@@ -3102,7 +3102,7 @@
           <a:p>
             <a:fld id="{E7773031-FEBD-457C-8C53-07D5C4D3FF8B}" type="datetimeFigureOut">
               <a:rPr lang="en-US" smtClean="0"/>
-              <a:t>5/14/2021</a:t>
+              <a:t>10/7/2021</a:t>
             </a:fld>
             <a:endParaRPr lang="en-US"/>
           </a:p>
@@ -3413,7 +3413,7 @@
           <a:p>
             <a:fld id="{E7773031-FEBD-457C-8C53-07D5C4D3FF8B}" type="datetimeFigureOut">
               <a:rPr lang="en-US" smtClean="0"/>
-              <a:t>5/14/2021</a:t>
+              <a:t>10/7/2021</a:t>
             </a:fld>
             <a:endParaRPr lang="en-US"/>
           </a:p>
@@ -3701,7 +3701,7 @@
           <a:p>
             <a:fld id="{E7773031-FEBD-457C-8C53-07D5C4D3FF8B}" type="datetimeFigureOut">
               <a:rPr lang="en-US" smtClean="0"/>
-              <a:t>5/14/2021</a:t>
+              <a:t>10/7/2021</a:t>
             </a:fld>
             <a:endParaRPr lang="en-US"/>
           </a:p>
@@ -3942,7 +3942,7 @@
           <a:p>
             <a:fld id="{E7773031-FEBD-457C-8C53-07D5C4D3FF8B}" type="datetimeFigureOut">
               <a:rPr lang="en-US" smtClean="0"/>
-              <a:t>5/14/2021</a:t>
+              <a:t>10/7/2021</a:t>
             </a:fld>
             <a:endParaRPr lang="en-US"/>
           </a:p>
@@ -6080,6 +6080,12 @@
               <a:t>Storm type 2</a:t>
             </a:r>
           </a:p>
+          <a:p>
+            <a:r>
+              <a:rPr lang="en-US" u="sng" dirty="0"/>
+              <a:t>Chosen for report</a:t>
+            </a:r>
+          </a:p>
         </p:txBody>
       </p:sp>
       <p:pic>
@@ -6526,6 +6532,12 @@
               <a:t>Storm type 1</a:t>
             </a:r>
           </a:p>
+          <a:p>
+            <a:r>
+              <a:rPr lang="en-US" u="sng" dirty="0"/>
+              <a:t>Chosen for report</a:t>
+            </a:r>
+          </a:p>
         </p:txBody>
       </p:sp>
       <p:pic>
@@ -6966,6 +6978,12 @@
               <a:t>Storm type 2</a:t>
             </a:r>
           </a:p>
+          <a:p>
+            <a:r>
+              <a:rPr lang="en-US" u="sng" dirty="0"/>
+              <a:t>Chosen for report</a:t>
+            </a:r>
+          </a:p>
         </p:txBody>
       </p:sp>
       <p:pic>
@@ -7850,6 +7868,12 @@
             <a:r>
               <a:rPr lang="en-US" dirty="0"/>
               <a:t>Storm type 1</a:t>
+            </a:r>
+          </a:p>
+          <a:p>
+            <a:r>
+              <a:rPr lang="en-US" u="sng" dirty="0"/>
+              <a:t>Chosen for report</a:t>
             </a:r>
           </a:p>
         </p:txBody>

</xml_diff>

<commit_message>
Created 4-storm selection summary
</commit_message>
<xml_diff>
--- a/sampexlib/Concept Summaries/MB-Iso_vs_BG-Iso.pptx
+++ b/sampexlib/Concept Summaries/MB-Iso_vs_BG-Iso.pptx
@@ -206,7 +206,7 @@
           <a:p>
             <a:fld id="{78EB3A88-4723-4221-9FD6-DC45C1FEF397}" type="datetimeFigureOut">
               <a:rPr lang="en-US" smtClean="0"/>
-              <a:t>10/7/2021</a:t>
+              <a:t>10/12/2021</a:t>
             </a:fld>
             <a:endParaRPr lang="en-US"/>
           </a:p>
@@ -1292,7 +1292,7 @@
           <a:p>
             <a:fld id="{E7773031-FEBD-457C-8C53-07D5C4D3FF8B}" type="datetimeFigureOut">
               <a:rPr lang="en-US" smtClean="0"/>
-              <a:t>10/7/2021</a:t>
+              <a:t>10/12/2021</a:t>
             </a:fld>
             <a:endParaRPr lang="en-US"/>
           </a:p>
@@ -1490,7 +1490,7 @@
           <a:p>
             <a:fld id="{E7773031-FEBD-457C-8C53-07D5C4D3FF8B}" type="datetimeFigureOut">
               <a:rPr lang="en-US" smtClean="0"/>
-              <a:t>10/7/2021</a:t>
+              <a:t>10/12/2021</a:t>
             </a:fld>
             <a:endParaRPr lang="en-US"/>
           </a:p>
@@ -1698,7 +1698,7 @@
           <a:p>
             <a:fld id="{E7773031-FEBD-457C-8C53-07D5C4D3FF8B}" type="datetimeFigureOut">
               <a:rPr lang="en-US" smtClean="0"/>
-              <a:t>10/7/2021</a:t>
+              <a:t>10/12/2021</a:t>
             </a:fld>
             <a:endParaRPr lang="en-US"/>
           </a:p>
@@ -1896,7 +1896,7 @@
           <a:p>
             <a:fld id="{E7773031-FEBD-457C-8C53-07D5C4D3FF8B}" type="datetimeFigureOut">
               <a:rPr lang="en-US" smtClean="0"/>
-              <a:t>10/7/2021</a:t>
+              <a:t>10/12/2021</a:t>
             </a:fld>
             <a:endParaRPr lang="en-US"/>
           </a:p>
@@ -2171,7 +2171,7 @@
           <a:p>
             <a:fld id="{E7773031-FEBD-457C-8C53-07D5C4D3FF8B}" type="datetimeFigureOut">
               <a:rPr lang="en-US" smtClean="0"/>
-              <a:t>10/7/2021</a:t>
+              <a:t>10/12/2021</a:t>
             </a:fld>
             <a:endParaRPr lang="en-US"/>
           </a:p>
@@ -2436,7 +2436,7 @@
           <a:p>
             <a:fld id="{E7773031-FEBD-457C-8C53-07D5C4D3FF8B}" type="datetimeFigureOut">
               <a:rPr lang="en-US" smtClean="0"/>
-              <a:t>10/7/2021</a:t>
+              <a:t>10/12/2021</a:t>
             </a:fld>
             <a:endParaRPr lang="en-US"/>
           </a:p>
@@ -2848,7 +2848,7 @@
           <a:p>
             <a:fld id="{E7773031-FEBD-457C-8C53-07D5C4D3FF8B}" type="datetimeFigureOut">
               <a:rPr lang="en-US" smtClean="0"/>
-              <a:t>10/7/2021</a:t>
+              <a:t>10/12/2021</a:t>
             </a:fld>
             <a:endParaRPr lang="en-US"/>
           </a:p>
@@ -2989,7 +2989,7 @@
           <a:p>
             <a:fld id="{E7773031-FEBD-457C-8C53-07D5C4D3FF8B}" type="datetimeFigureOut">
               <a:rPr lang="en-US" smtClean="0"/>
-              <a:t>10/7/2021</a:t>
+              <a:t>10/12/2021</a:t>
             </a:fld>
             <a:endParaRPr lang="en-US"/>
           </a:p>
@@ -3102,7 +3102,7 @@
           <a:p>
             <a:fld id="{E7773031-FEBD-457C-8C53-07D5C4D3FF8B}" type="datetimeFigureOut">
               <a:rPr lang="en-US" smtClean="0"/>
-              <a:t>10/7/2021</a:t>
+              <a:t>10/12/2021</a:t>
             </a:fld>
             <a:endParaRPr lang="en-US"/>
           </a:p>
@@ -3413,7 +3413,7 @@
           <a:p>
             <a:fld id="{E7773031-FEBD-457C-8C53-07D5C4D3FF8B}" type="datetimeFigureOut">
               <a:rPr lang="en-US" smtClean="0"/>
-              <a:t>10/7/2021</a:t>
+              <a:t>10/12/2021</a:t>
             </a:fld>
             <a:endParaRPr lang="en-US"/>
           </a:p>
@@ -3701,7 +3701,7 @@
           <a:p>
             <a:fld id="{E7773031-FEBD-457C-8C53-07D5C4D3FF8B}" type="datetimeFigureOut">
               <a:rPr lang="en-US" smtClean="0"/>
-              <a:t>10/7/2021</a:t>
+              <a:t>10/12/2021</a:t>
             </a:fld>
             <a:endParaRPr lang="en-US"/>
           </a:p>
@@ -3942,7 +3942,7 @@
           <a:p>
             <a:fld id="{E7773031-FEBD-457C-8C53-07D5C4D3FF8B}" type="datetimeFigureOut">
               <a:rPr lang="en-US" smtClean="0"/>
-              <a:t>10/7/2021</a:t>
+              <a:t>10/12/2021</a:t>
             </a:fld>
             <a:endParaRPr lang="en-US"/>
           </a:p>

</xml_diff>

<commit_message>
Edited ISO vs AE histograms
</commit_message>
<xml_diff>
--- a/sampexlib/Concept Summaries/MB-Iso_vs_BG-Iso.pptx
+++ b/sampexlib/Concept Summaries/MB-Iso_vs_BG-Iso.pptx
@@ -206,7 +206,7 @@
           <a:p>
             <a:fld id="{78EB3A88-4723-4221-9FD6-DC45C1FEF397}" type="datetimeFigureOut">
               <a:rPr lang="en-US" smtClean="0"/>
-              <a:t>10/26/2021</a:t>
+              <a:t>11/2/2021</a:t>
             </a:fld>
             <a:endParaRPr lang="en-US"/>
           </a:p>
@@ -1292,7 +1292,7 @@
           <a:p>
             <a:fld id="{E7773031-FEBD-457C-8C53-07D5C4D3FF8B}" type="datetimeFigureOut">
               <a:rPr lang="en-US" smtClean="0"/>
-              <a:t>10/26/2021</a:t>
+              <a:t>11/2/2021</a:t>
             </a:fld>
             <a:endParaRPr lang="en-US"/>
           </a:p>
@@ -1490,7 +1490,7 @@
           <a:p>
             <a:fld id="{E7773031-FEBD-457C-8C53-07D5C4D3FF8B}" type="datetimeFigureOut">
               <a:rPr lang="en-US" smtClean="0"/>
-              <a:t>10/26/2021</a:t>
+              <a:t>11/2/2021</a:t>
             </a:fld>
             <a:endParaRPr lang="en-US"/>
           </a:p>
@@ -1698,7 +1698,7 @@
           <a:p>
             <a:fld id="{E7773031-FEBD-457C-8C53-07D5C4D3FF8B}" type="datetimeFigureOut">
               <a:rPr lang="en-US" smtClean="0"/>
-              <a:t>10/26/2021</a:t>
+              <a:t>11/2/2021</a:t>
             </a:fld>
             <a:endParaRPr lang="en-US"/>
           </a:p>
@@ -1896,7 +1896,7 @@
           <a:p>
             <a:fld id="{E7773031-FEBD-457C-8C53-07D5C4D3FF8B}" type="datetimeFigureOut">
               <a:rPr lang="en-US" smtClean="0"/>
-              <a:t>10/26/2021</a:t>
+              <a:t>11/2/2021</a:t>
             </a:fld>
             <a:endParaRPr lang="en-US"/>
           </a:p>
@@ -2171,7 +2171,7 @@
           <a:p>
             <a:fld id="{E7773031-FEBD-457C-8C53-07D5C4D3FF8B}" type="datetimeFigureOut">
               <a:rPr lang="en-US" smtClean="0"/>
-              <a:t>10/26/2021</a:t>
+              <a:t>11/2/2021</a:t>
             </a:fld>
             <a:endParaRPr lang="en-US"/>
           </a:p>
@@ -2436,7 +2436,7 @@
           <a:p>
             <a:fld id="{E7773031-FEBD-457C-8C53-07D5C4D3FF8B}" type="datetimeFigureOut">
               <a:rPr lang="en-US" smtClean="0"/>
-              <a:t>10/26/2021</a:t>
+              <a:t>11/2/2021</a:t>
             </a:fld>
             <a:endParaRPr lang="en-US"/>
           </a:p>
@@ -2848,7 +2848,7 @@
           <a:p>
             <a:fld id="{E7773031-FEBD-457C-8C53-07D5C4D3FF8B}" type="datetimeFigureOut">
               <a:rPr lang="en-US" smtClean="0"/>
-              <a:t>10/26/2021</a:t>
+              <a:t>11/2/2021</a:t>
             </a:fld>
             <a:endParaRPr lang="en-US"/>
           </a:p>
@@ -2989,7 +2989,7 @@
           <a:p>
             <a:fld id="{E7773031-FEBD-457C-8C53-07D5C4D3FF8B}" type="datetimeFigureOut">
               <a:rPr lang="en-US" smtClean="0"/>
-              <a:t>10/26/2021</a:t>
+              <a:t>11/2/2021</a:t>
             </a:fld>
             <a:endParaRPr lang="en-US"/>
           </a:p>
@@ -3102,7 +3102,7 @@
           <a:p>
             <a:fld id="{E7773031-FEBD-457C-8C53-07D5C4D3FF8B}" type="datetimeFigureOut">
               <a:rPr lang="en-US" smtClean="0"/>
-              <a:t>10/26/2021</a:t>
+              <a:t>11/2/2021</a:t>
             </a:fld>
             <a:endParaRPr lang="en-US"/>
           </a:p>
@@ -3413,7 +3413,7 @@
           <a:p>
             <a:fld id="{E7773031-FEBD-457C-8C53-07D5C4D3FF8B}" type="datetimeFigureOut">
               <a:rPr lang="en-US" smtClean="0"/>
-              <a:t>10/26/2021</a:t>
+              <a:t>11/2/2021</a:t>
             </a:fld>
             <a:endParaRPr lang="en-US"/>
           </a:p>
@@ -3701,7 +3701,7 @@
           <a:p>
             <a:fld id="{E7773031-FEBD-457C-8C53-07D5C4D3FF8B}" type="datetimeFigureOut">
               <a:rPr lang="en-US" smtClean="0"/>
-              <a:t>10/26/2021</a:t>
+              <a:t>11/2/2021</a:t>
             </a:fld>
             <a:endParaRPr lang="en-US"/>
           </a:p>
@@ -3942,7 +3942,7 @@
           <a:p>
             <a:fld id="{E7773031-FEBD-457C-8C53-07D5C4D3FF8B}" type="datetimeFigureOut">
               <a:rPr lang="en-US" smtClean="0"/>
-              <a:t>10/26/2021</a:t>
+              <a:t>11/2/2021</a:t>
             </a:fld>
             <a:endParaRPr lang="en-US"/>
           </a:p>
@@ -6535,7 +6535,7 @@
           <a:p>
             <a:r>
               <a:rPr lang="en-US" u="sng" dirty="0"/>
-              <a:t>Chosen for report</a:t>
+              <a:t>Irregular</a:t>
             </a:r>
           </a:p>
         </p:txBody>
@@ -7422,6 +7422,12 @@
             <a:r>
               <a:rPr lang="en-US" dirty="0"/>
               <a:t>Storm type 2</a:t>
+            </a:r>
+          </a:p>
+          <a:p>
+            <a:r>
+              <a:rPr lang="en-US" dirty="0"/>
+              <a:t>Irregular</a:t>
             </a:r>
           </a:p>
         </p:txBody>

</xml_diff>

<commit_message>
Changes to Dst-binned iso code
</commit_message>
<xml_diff>
--- a/sampexlib/Concept Summaries/MB-Iso_vs_BG-Iso.pptx
+++ b/sampexlib/Concept Summaries/MB-Iso_vs_BG-Iso.pptx
@@ -206,7 +206,7 @@
           <a:p>
             <a:fld id="{78EB3A88-4723-4221-9FD6-DC45C1FEF397}" type="datetimeFigureOut">
               <a:rPr lang="en-US" smtClean="0"/>
-              <a:t>11/2/2021</a:t>
+              <a:t>11/4/2021</a:t>
             </a:fld>
             <a:endParaRPr lang="en-US"/>
           </a:p>
@@ -1292,7 +1292,7 @@
           <a:p>
             <a:fld id="{E7773031-FEBD-457C-8C53-07D5C4D3FF8B}" type="datetimeFigureOut">
               <a:rPr lang="en-US" smtClean="0"/>
-              <a:t>11/2/2021</a:t>
+              <a:t>11/4/2021</a:t>
             </a:fld>
             <a:endParaRPr lang="en-US"/>
           </a:p>
@@ -1490,7 +1490,7 @@
           <a:p>
             <a:fld id="{E7773031-FEBD-457C-8C53-07D5C4D3FF8B}" type="datetimeFigureOut">
               <a:rPr lang="en-US" smtClean="0"/>
-              <a:t>11/2/2021</a:t>
+              <a:t>11/4/2021</a:t>
             </a:fld>
             <a:endParaRPr lang="en-US"/>
           </a:p>
@@ -1698,7 +1698,7 @@
           <a:p>
             <a:fld id="{E7773031-FEBD-457C-8C53-07D5C4D3FF8B}" type="datetimeFigureOut">
               <a:rPr lang="en-US" smtClean="0"/>
-              <a:t>11/2/2021</a:t>
+              <a:t>11/4/2021</a:t>
             </a:fld>
             <a:endParaRPr lang="en-US"/>
           </a:p>
@@ -1896,7 +1896,7 @@
           <a:p>
             <a:fld id="{E7773031-FEBD-457C-8C53-07D5C4D3FF8B}" type="datetimeFigureOut">
               <a:rPr lang="en-US" smtClean="0"/>
-              <a:t>11/2/2021</a:t>
+              <a:t>11/4/2021</a:t>
             </a:fld>
             <a:endParaRPr lang="en-US"/>
           </a:p>
@@ -2171,7 +2171,7 @@
           <a:p>
             <a:fld id="{E7773031-FEBD-457C-8C53-07D5C4D3FF8B}" type="datetimeFigureOut">
               <a:rPr lang="en-US" smtClean="0"/>
-              <a:t>11/2/2021</a:t>
+              <a:t>11/4/2021</a:t>
             </a:fld>
             <a:endParaRPr lang="en-US"/>
           </a:p>
@@ -2436,7 +2436,7 @@
           <a:p>
             <a:fld id="{E7773031-FEBD-457C-8C53-07D5C4D3FF8B}" type="datetimeFigureOut">
               <a:rPr lang="en-US" smtClean="0"/>
-              <a:t>11/2/2021</a:t>
+              <a:t>11/4/2021</a:t>
             </a:fld>
             <a:endParaRPr lang="en-US"/>
           </a:p>
@@ -2848,7 +2848,7 @@
           <a:p>
             <a:fld id="{E7773031-FEBD-457C-8C53-07D5C4D3FF8B}" type="datetimeFigureOut">
               <a:rPr lang="en-US" smtClean="0"/>
-              <a:t>11/2/2021</a:t>
+              <a:t>11/4/2021</a:t>
             </a:fld>
             <a:endParaRPr lang="en-US"/>
           </a:p>
@@ -2989,7 +2989,7 @@
           <a:p>
             <a:fld id="{E7773031-FEBD-457C-8C53-07D5C4D3FF8B}" type="datetimeFigureOut">
               <a:rPr lang="en-US" smtClean="0"/>
-              <a:t>11/2/2021</a:t>
+              <a:t>11/4/2021</a:t>
             </a:fld>
             <a:endParaRPr lang="en-US"/>
           </a:p>
@@ -3102,7 +3102,7 @@
           <a:p>
             <a:fld id="{E7773031-FEBD-457C-8C53-07D5C4D3FF8B}" type="datetimeFigureOut">
               <a:rPr lang="en-US" smtClean="0"/>
-              <a:t>11/2/2021</a:t>
+              <a:t>11/4/2021</a:t>
             </a:fld>
             <a:endParaRPr lang="en-US"/>
           </a:p>
@@ -3413,7 +3413,7 @@
           <a:p>
             <a:fld id="{E7773031-FEBD-457C-8C53-07D5C4D3FF8B}" type="datetimeFigureOut">
               <a:rPr lang="en-US" smtClean="0"/>
-              <a:t>11/2/2021</a:t>
+              <a:t>11/4/2021</a:t>
             </a:fld>
             <a:endParaRPr lang="en-US"/>
           </a:p>
@@ -3701,7 +3701,7 @@
           <a:p>
             <a:fld id="{E7773031-FEBD-457C-8C53-07D5C4D3FF8B}" type="datetimeFigureOut">
               <a:rPr lang="en-US" smtClean="0"/>
-              <a:t>11/2/2021</a:t>
+              <a:t>11/4/2021</a:t>
             </a:fld>
             <a:endParaRPr lang="en-US"/>
           </a:p>
@@ -3942,7 +3942,7 @@
           <a:p>
             <a:fld id="{E7773031-FEBD-457C-8C53-07D5C4D3FF8B}" type="datetimeFigureOut">
               <a:rPr lang="en-US" smtClean="0"/>
-              <a:t>11/2/2021</a:t>
+              <a:t>11/4/2021</a:t>
             </a:fld>
             <a:endParaRPr lang="en-US"/>
           </a:p>

</xml_diff>